<commit_message>
ppt with book example started
</commit_message>
<xml_diff>
--- a/CLR_via_CSharp/21_GarbageCollection/21_GarbageCollection.pptx
+++ b/CLR_via_CSharp/21_GarbageCollection/21_GarbageCollection.pptx
@@ -24,6 +24,11 @@
     <p:sldId id="274" r:id="rId18"/>
     <p:sldId id="275" r:id="rId19"/>
     <p:sldId id="276" r:id="rId20"/>
+    <p:sldId id="277" r:id="rId21"/>
+    <p:sldId id="278" r:id="rId22"/>
+    <p:sldId id="279" r:id="rId23"/>
+    <p:sldId id="280" r:id="rId24"/>
+    <p:sldId id="281" r:id="rId25"/>
   </p:sldIdLst>
   <p:sldSz cx="12192000" cy="6858000"/>
   <p:notesSz cx="6858000" cy="9144000"/>
@@ -12750,6 +12755,1685 @@
 </p:sld>
 </file>
 
+<file path=ppt/slides/slide20.xml><?xml version="1.0" encoding="utf-8"?>
+<p:sld xmlns:a="http://schemas.openxmlformats.org/drawingml/2006/main" xmlns:r="http://schemas.openxmlformats.org/officeDocument/2006/relationships" xmlns:p="http://schemas.openxmlformats.org/presentationml/2006/main">
+  <p:cSld>
+    <p:spTree>
+      <p:nvGrpSpPr>
+        <p:cNvPr id="1" name=""/>
+        <p:cNvGrpSpPr/>
+        <p:nvPr/>
+      </p:nvGrpSpPr>
+      <p:grpSpPr>
+        <a:xfrm>
+          <a:off x="0" y="0"/>
+          <a:ext cx="0" cy="0"/>
+          <a:chOff x="0" y="0"/>
+          <a:chExt cx="0" cy="0"/>
+        </a:xfrm>
+      </p:grpSpPr>
+      <p:sp>
+        <p:nvSpPr>
+          <p:cNvPr id="2" name="Title 1">
+            <a:extLst>
+              <a:ext uri="{FF2B5EF4-FFF2-40B4-BE49-F238E27FC236}">
+                <a16:creationId xmlns:a16="http://schemas.microsoft.com/office/drawing/2014/main" id="{DB964178-E18F-D0B9-A66B-16794FC6F42A}"/>
+              </a:ext>
+            </a:extLst>
+          </p:cNvPr>
+          <p:cNvSpPr>
+            <a:spLocks noGrp="1"/>
+          </p:cNvSpPr>
+          <p:nvPr>
+            <p:ph type="title"/>
+          </p:nvPr>
+        </p:nvSpPr>
+        <p:spPr/>
+        <p:txBody>
+          <a:bodyPr/>
+          <a:lstStyle/>
+          <a:p>
+            <a:r>
+              <a:rPr lang="en-US" dirty="0"/>
+              <a:t>Garbage Collection Fundamentals according to Jeffrey</a:t>
+            </a:r>
+          </a:p>
+        </p:txBody>
+      </p:sp>
+      <p:sp>
+        <p:nvSpPr>
+          <p:cNvPr id="3" name="Content Placeholder 2">
+            <a:extLst>
+              <a:ext uri="{FF2B5EF4-FFF2-40B4-BE49-F238E27FC236}">
+                <a16:creationId xmlns:a16="http://schemas.microsoft.com/office/drawing/2014/main" id="{655EC522-52E3-DC14-972D-EE929C766533}"/>
+              </a:ext>
+            </a:extLst>
+          </p:cNvPr>
+          <p:cNvSpPr>
+            <a:spLocks noGrp="1"/>
+          </p:cNvSpPr>
+          <p:nvPr>
+            <p:ph idx="1"/>
+          </p:nvPr>
+        </p:nvSpPr>
+        <p:spPr/>
+        <p:txBody>
+          <a:bodyPr/>
+          <a:lstStyle/>
+          <a:p>
+            <a:pPr marL="0" indent="0">
+              <a:buNone/>
+            </a:pPr>
+            <a:r>
+              <a:rPr lang="en-US" dirty="0"/>
+              <a:t>In general</a:t>
+            </a:r>
+          </a:p>
+          <a:p>
+            <a:pPr>
+              <a:buFontTx/>
+              <a:buChar char="-"/>
+            </a:pPr>
+            <a:r>
+              <a:rPr lang="en-US" dirty="0"/>
+              <a:t>The new an object is, the shorter its life time is</a:t>
+            </a:r>
+          </a:p>
+          <a:p>
+            <a:pPr>
+              <a:buFontTx/>
+              <a:buChar char="-"/>
+            </a:pPr>
+            <a:r>
+              <a:rPr lang="en-US" dirty="0"/>
+              <a:t>The older an object is, the longer its life time is.</a:t>
+            </a:r>
+          </a:p>
+          <a:p>
+            <a:pPr>
+              <a:buFontTx/>
+              <a:buChar char="-"/>
+            </a:pPr>
+            <a:r>
+              <a:rPr lang="en-US" dirty="0"/>
+              <a:t>Collection a portion of the heap is faster than collecting the whole heap</a:t>
+            </a:r>
+          </a:p>
+        </p:txBody>
+      </p:sp>
+    </p:spTree>
+    <p:extLst>
+      <p:ext uri="{BB962C8B-B14F-4D97-AF65-F5344CB8AC3E}">
+        <p14:creationId xmlns:p14="http://schemas.microsoft.com/office/powerpoint/2010/main" val="4233739116"/>
+      </p:ext>
+    </p:extLst>
+  </p:cSld>
+  <p:clrMapOvr>
+    <a:masterClrMapping/>
+  </p:clrMapOvr>
+</p:sld>
+</file>
+
+<file path=ppt/slides/slide21.xml><?xml version="1.0" encoding="utf-8"?>
+<p:sld xmlns:a="http://schemas.openxmlformats.org/drawingml/2006/main" xmlns:r="http://schemas.openxmlformats.org/officeDocument/2006/relationships" xmlns:p="http://schemas.openxmlformats.org/presentationml/2006/main">
+  <p:cSld>
+    <p:spTree>
+      <p:nvGrpSpPr>
+        <p:cNvPr id="1" name=""/>
+        <p:cNvGrpSpPr/>
+        <p:nvPr/>
+      </p:nvGrpSpPr>
+      <p:grpSpPr>
+        <a:xfrm>
+          <a:off x="0" y="0"/>
+          <a:ext cx="0" cy="0"/>
+          <a:chOff x="0" y="0"/>
+          <a:chExt cx="0" cy="0"/>
+        </a:xfrm>
+      </p:grpSpPr>
+      <p:sp>
+        <p:nvSpPr>
+          <p:cNvPr id="2" name="Title 1">
+            <a:extLst>
+              <a:ext uri="{FF2B5EF4-FFF2-40B4-BE49-F238E27FC236}">
+                <a16:creationId xmlns:a16="http://schemas.microsoft.com/office/drawing/2014/main" id="{6A3C5D9E-013C-2314-426C-DF48EFFDBB5F}"/>
+              </a:ext>
+            </a:extLst>
+          </p:cNvPr>
+          <p:cNvSpPr>
+            <a:spLocks noGrp="1"/>
+          </p:cNvSpPr>
+          <p:nvPr>
+            <p:ph type="title"/>
+          </p:nvPr>
+        </p:nvSpPr>
+        <p:spPr/>
+        <p:txBody>
+          <a:bodyPr/>
+          <a:lstStyle/>
+          <a:p>
+            <a:r>
+              <a:rPr lang="en-US" dirty="0"/>
+              <a:t>Generations</a:t>
+            </a:r>
+          </a:p>
+        </p:txBody>
+      </p:sp>
+      <p:sp>
+        <p:nvSpPr>
+          <p:cNvPr id="3" name="Content Placeholder 2">
+            <a:extLst>
+              <a:ext uri="{FF2B5EF4-FFF2-40B4-BE49-F238E27FC236}">
+                <a16:creationId xmlns:a16="http://schemas.microsoft.com/office/drawing/2014/main" id="{AF9C6C4D-F14C-EC3E-C9F7-BD9A354A3103}"/>
+              </a:ext>
+            </a:extLst>
+          </p:cNvPr>
+          <p:cNvSpPr>
+            <a:spLocks noGrp="1"/>
+          </p:cNvSpPr>
+          <p:nvPr>
+            <p:ph idx="1"/>
+          </p:nvPr>
+        </p:nvSpPr>
+        <p:spPr/>
+        <p:txBody>
+          <a:bodyPr/>
+          <a:lstStyle/>
+          <a:p>
+            <a:r>
+              <a:rPr lang="en-US" dirty="0"/>
+              <a:t>What if we can separate the garbage collections based off of how long they’ve survived and have different “collections” based on that?</a:t>
+            </a:r>
+          </a:p>
+        </p:txBody>
+      </p:sp>
+    </p:spTree>
+    <p:extLst>
+      <p:ext uri="{BB962C8B-B14F-4D97-AF65-F5344CB8AC3E}">
+        <p14:creationId xmlns:p14="http://schemas.microsoft.com/office/powerpoint/2010/main" val="3644168990"/>
+      </p:ext>
+    </p:extLst>
+  </p:cSld>
+  <p:clrMapOvr>
+    <a:masterClrMapping/>
+  </p:clrMapOvr>
+</p:sld>
+</file>
+
+<file path=ppt/slides/slide22.xml><?xml version="1.0" encoding="utf-8"?>
+<p:sld xmlns:a="http://schemas.openxmlformats.org/drawingml/2006/main" xmlns:r="http://schemas.openxmlformats.org/officeDocument/2006/relationships" xmlns:p="http://schemas.openxmlformats.org/presentationml/2006/main">
+  <p:cSld>
+    <p:spTree>
+      <p:nvGrpSpPr>
+        <p:cNvPr id="1" name=""/>
+        <p:cNvGrpSpPr/>
+        <p:nvPr/>
+      </p:nvGrpSpPr>
+      <p:grpSpPr>
+        <a:xfrm>
+          <a:off x="0" y="0"/>
+          <a:ext cx="0" cy="0"/>
+          <a:chOff x="0" y="0"/>
+          <a:chExt cx="0" cy="0"/>
+        </a:xfrm>
+      </p:grpSpPr>
+      <p:sp>
+        <p:nvSpPr>
+          <p:cNvPr id="2" name="Title 1">
+            <a:extLst>
+              <a:ext uri="{FF2B5EF4-FFF2-40B4-BE49-F238E27FC236}">
+                <a16:creationId xmlns:a16="http://schemas.microsoft.com/office/drawing/2014/main" id="{DD77E620-ED17-29F0-49C1-BA44F26A2145}"/>
+              </a:ext>
+            </a:extLst>
+          </p:cNvPr>
+          <p:cNvSpPr>
+            <a:spLocks noGrp="1"/>
+          </p:cNvSpPr>
+          <p:nvPr>
+            <p:ph type="title"/>
+          </p:nvPr>
+        </p:nvSpPr>
+        <p:spPr/>
+        <p:txBody>
+          <a:bodyPr/>
+          <a:lstStyle/>
+          <a:p>
+            <a:r>
+              <a:rPr lang="en-US"/>
+              <a:t>Book Example</a:t>
+            </a:r>
+            <a:endParaRPr lang="en-US" dirty="0"/>
+          </a:p>
+        </p:txBody>
+      </p:sp>
+      <p:sp>
+        <p:nvSpPr>
+          <p:cNvPr id="4" name="Rectangle 3">
+            <a:extLst>
+              <a:ext uri="{FF2B5EF4-FFF2-40B4-BE49-F238E27FC236}">
+                <a16:creationId xmlns:a16="http://schemas.microsoft.com/office/drawing/2014/main" id="{978107BF-32B4-2151-18EC-3F842645CCDE}"/>
+              </a:ext>
+            </a:extLst>
+          </p:cNvPr>
+          <p:cNvSpPr/>
+          <p:nvPr/>
+        </p:nvSpPr>
+        <p:spPr>
+          <a:xfrm>
+            <a:off x="679174" y="1901213"/>
+            <a:ext cx="757260" cy="544060"/>
+          </a:xfrm>
+          <a:prstGeom prst="rect">
+            <a:avLst/>
+          </a:prstGeom>
+        </p:spPr>
+        <p:style>
+          <a:lnRef idx="2">
+            <a:schemeClr val="accent2">
+              <a:shade val="50000"/>
+            </a:schemeClr>
+          </a:lnRef>
+          <a:fillRef idx="1">
+            <a:schemeClr val="accent2"/>
+          </a:fillRef>
+          <a:effectRef idx="0">
+            <a:schemeClr val="accent2"/>
+          </a:effectRef>
+          <a:fontRef idx="minor">
+            <a:schemeClr val="lt1"/>
+          </a:fontRef>
+        </p:style>
+        <p:txBody>
+          <a:bodyPr rtlCol="0" anchor="ctr"/>
+          <a:lstStyle/>
+          <a:p>
+            <a:pPr algn="ctr"/>
+            <a:r>
+              <a:rPr lang="en-US" dirty="0"/>
+              <a:t>A</a:t>
+            </a:r>
+          </a:p>
+        </p:txBody>
+      </p:sp>
+      <p:sp>
+        <p:nvSpPr>
+          <p:cNvPr id="5" name="Rectangle 4">
+            <a:extLst>
+              <a:ext uri="{FF2B5EF4-FFF2-40B4-BE49-F238E27FC236}">
+                <a16:creationId xmlns:a16="http://schemas.microsoft.com/office/drawing/2014/main" id="{624B90BA-275C-5BE0-958A-C4C98F06DBF1}"/>
+              </a:ext>
+            </a:extLst>
+          </p:cNvPr>
+          <p:cNvSpPr/>
+          <p:nvPr/>
+        </p:nvSpPr>
+        <p:spPr>
+          <a:xfrm>
+            <a:off x="1436434" y="1901213"/>
+            <a:ext cx="757260" cy="544060"/>
+          </a:xfrm>
+          <a:prstGeom prst="rect">
+            <a:avLst/>
+          </a:prstGeom>
+        </p:spPr>
+        <p:style>
+          <a:lnRef idx="2">
+            <a:schemeClr val="accent2">
+              <a:shade val="50000"/>
+            </a:schemeClr>
+          </a:lnRef>
+          <a:fillRef idx="1">
+            <a:schemeClr val="accent2"/>
+          </a:fillRef>
+          <a:effectRef idx="0">
+            <a:schemeClr val="accent2"/>
+          </a:effectRef>
+          <a:fontRef idx="minor">
+            <a:schemeClr val="lt1"/>
+          </a:fontRef>
+        </p:style>
+        <p:txBody>
+          <a:bodyPr rtlCol="0" anchor="ctr"/>
+          <a:lstStyle/>
+          <a:p>
+            <a:pPr algn="ctr"/>
+            <a:r>
+              <a:rPr lang="en-US" dirty="0"/>
+              <a:t>B</a:t>
+            </a:r>
+          </a:p>
+        </p:txBody>
+      </p:sp>
+      <p:sp>
+        <p:nvSpPr>
+          <p:cNvPr id="6" name="Rectangle 5">
+            <a:extLst>
+              <a:ext uri="{FF2B5EF4-FFF2-40B4-BE49-F238E27FC236}">
+                <a16:creationId xmlns:a16="http://schemas.microsoft.com/office/drawing/2014/main" id="{E3A939CC-33F8-DE90-25AC-4390605E1573}"/>
+              </a:ext>
+            </a:extLst>
+          </p:cNvPr>
+          <p:cNvSpPr/>
+          <p:nvPr/>
+        </p:nvSpPr>
+        <p:spPr>
+          <a:xfrm>
+            <a:off x="2205152" y="1901213"/>
+            <a:ext cx="757260" cy="544060"/>
+          </a:xfrm>
+          <a:prstGeom prst="rect">
+            <a:avLst/>
+          </a:prstGeom>
+        </p:spPr>
+        <p:style>
+          <a:lnRef idx="2">
+            <a:schemeClr val="accent1">
+              <a:shade val="50000"/>
+            </a:schemeClr>
+          </a:lnRef>
+          <a:fillRef idx="1">
+            <a:schemeClr val="accent1"/>
+          </a:fillRef>
+          <a:effectRef idx="0">
+            <a:schemeClr val="accent1"/>
+          </a:effectRef>
+          <a:fontRef idx="minor">
+            <a:schemeClr val="lt1"/>
+          </a:fontRef>
+        </p:style>
+        <p:txBody>
+          <a:bodyPr rtlCol="0" anchor="ctr"/>
+          <a:lstStyle/>
+          <a:p>
+            <a:pPr algn="ctr"/>
+            <a:r>
+              <a:rPr lang="en-US" dirty="0"/>
+              <a:t>C</a:t>
+            </a:r>
+          </a:p>
+        </p:txBody>
+      </p:sp>
+      <p:sp>
+        <p:nvSpPr>
+          <p:cNvPr id="7" name="Rectangle 6">
+            <a:extLst>
+              <a:ext uri="{FF2B5EF4-FFF2-40B4-BE49-F238E27FC236}">
+                <a16:creationId xmlns:a16="http://schemas.microsoft.com/office/drawing/2014/main" id="{57E69964-16F2-E3A5-8FC0-F9CB54CB78B5}"/>
+              </a:ext>
+            </a:extLst>
+          </p:cNvPr>
+          <p:cNvSpPr/>
+          <p:nvPr/>
+        </p:nvSpPr>
+        <p:spPr>
+          <a:xfrm>
+            <a:off x="2973870" y="1901213"/>
+            <a:ext cx="757260" cy="544060"/>
+          </a:xfrm>
+          <a:prstGeom prst="rect">
+            <a:avLst/>
+          </a:prstGeom>
+        </p:spPr>
+        <p:style>
+          <a:lnRef idx="2">
+            <a:schemeClr val="accent2">
+              <a:shade val="50000"/>
+            </a:schemeClr>
+          </a:lnRef>
+          <a:fillRef idx="1">
+            <a:schemeClr val="accent2"/>
+          </a:fillRef>
+          <a:effectRef idx="0">
+            <a:schemeClr val="accent2"/>
+          </a:effectRef>
+          <a:fontRef idx="minor">
+            <a:schemeClr val="lt1"/>
+          </a:fontRef>
+        </p:style>
+        <p:txBody>
+          <a:bodyPr rtlCol="0" anchor="ctr"/>
+          <a:lstStyle/>
+          <a:p>
+            <a:pPr algn="ctr"/>
+            <a:r>
+              <a:rPr lang="en-US" dirty="0"/>
+              <a:t>D</a:t>
+            </a:r>
+          </a:p>
+        </p:txBody>
+      </p:sp>
+      <p:sp>
+        <p:nvSpPr>
+          <p:cNvPr id="8" name="Rectangle 7">
+            <a:extLst>
+              <a:ext uri="{FF2B5EF4-FFF2-40B4-BE49-F238E27FC236}">
+                <a16:creationId xmlns:a16="http://schemas.microsoft.com/office/drawing/2014/main" id="{11C120C6-4E8F-75EB-E8AE-8AE4FDB74B53}"/>
+              </a:ext>
+            </a:extLst>
+          </p:cNvPr>
+          <p:cNvSpPr/>
+          <p:nvPr/>
+        </p:nvSpPr>
+        <p:spPr>
+          <a:xfrm>
+            <a:off x="3742588" y="1898843"/>
+            <a:ext cx="757260" cy="544060"/>
+          </a:xfrm>
+          <a:prstGeom prst="rect">
+            <a:avLst/>
+          </a:prstGeom>
+        </p:spPr>
+        <p:style>
+          <a:lnRef idx="2">
+            <a:schemeClr val="accent1">
+              <a:shade val="50000"/>
+            </a:schemeClr>
+          </a:lnRef>
+          <a:fillRef idx="1">
+            <a:schemeClr val="accent1"/>
+          </a:fillRef>
+          <a:effectRef idx="0">
+            <a:schemeClr val="accent1"/>
+          </a:effectRef>
+          <a:fontRef idx="minor">
+            <a:schemeClr val="lt1"/>
+          </a:fontRef>
+        </p:style>
+        <p:txBody>
+          <a:bodyPr rtlCol="0" anchor="ctr"/>
+          <a:lstStyle/>
+          <a:p>
+            <a:pPr algn="ctr"/>
+            <a:r>
+              <a:rPr lang="en-US" dirty="0"/>
+              <a:t>E</a:t>
+            </a:r>
+          </a:p>
+        </p:txBody>
+      </p:sp>
+      <p:sp>
+        <p:nvSpPr>
+          <p:cNvPr id="9" name="Rectangle 8">
+            <a:extLst>
+              <a:ext uri="{FF2B5EF4-FFF2-40B4-BE49-F238E27FC236}">
+                <a16:creationId xmlns:a16="http://schemas.microsoft.com/office/drawing/2014/main" id="{03E14132-893A-9588-E1F1-B5F06AF3AA4D}"/>
+              </a:ext>
+            </a:extLst>
+          </p:cNvPr>
+          <p:cNvSpPr/>
+          <p:nvPr/>
+        </p:nvSpPr>
+        <p:spPr>
+          <a:xfrm>
+            <a:off x="9508812" y="845608"/>
+            <a:ext cx="1533837" cy="544060"/>
+          </a:xfrm>
+          <a:prstGeom prst="rect">
+            <a:avLst/>
+          </a:prstGeom>
+        </p:spPr>
+        <p:style>
+          <a:lnRef idx="2">
+            <a:schemeClr val="accent1">
+              <a:shade val="50000"/>
+            </a:schemeClr>
+          </a:lnRef>
+          <a:fillRef idx="1">
+            <a:schemeClr val="accent1"/>
+          </a:fillRef>
+          <a:effectRef idx="0">
+            <a:schemeClr val="accent1"/>
+          </a:effectRef>
+          <a:fontRef idx="minor">
+            <a:schemeClr val="lt1"/>
+          </a:fontRef>
+        </p:style>
+        <p:txBody>
+          <a:bodyPr rtlCol="0" anchor="ctr"/>
+          <a:lstStyle/>
+          <a:p>
+            <a:pPr algn="ctr"/>
+            <a:r>
+              <a:rPr lang="en-US" dirty="0"/>
+              <a:t>Discard</a:t>
+            </a:r>
+          </a:p>
+        </p:txBody>
+      </p:sp>
+      <p:sp>
+        <p:nvSpPr>
+          <p:cNvPr id="10" name="Rectangle 9">
+            <a:extLst>
+              <a:ext uri="{FF2B5EF4-FFF2-40B4-BE49-F238E27FC236}">
+                <a16:creationId xmlns:a16="http://schemas.microsoft.com/office/drawing/2014/main" id="{46F7797C-3CE4-2292-0AE9-5EB9A712E28E}"/>
+              </a:ext>
+            </a:extLst>
+          </p:cNvPr>
+          <p:cNvSpPr/>
+          <p:nvPr/>
+        </p:nvSpPr>
+        <p:spPr>
+          <a:xfrm>
+            <a:off x="9518469" y="1690688"/>
+            <a:ext cx="1533837" cy="544060"/>
+          </a:xfrm>
+          <a:prstGeom prst="rect">
+            <a:avLst/>
+          </a:prstGeom>
+        </p:spPr>
+        <p:style>
+          <a:lnRef idx="2">
+            <a:schemeClr val="accent2">
+              <a:shade val="50000"/>
+            </a:schemeClr>
+          </a:lnRef>
+          <a:fillRef idx="1">
+            <a:schemeClr val="accent2"/>
+          </a:fillRef>
+          <a:effectRef idx="0">
+            <a:schemeClr val="accent2"/>
+          </a:effectRef>
+          <a:fontRef idx="minor">
+            <a:schemeClr val="lt1"/>
+          </a:fontRef>
+        </p:style>
+        <p:txBody>
+          <a:bodyPr rtlCol="0" anchor="ctr"/>
+          <a:lstStyle/>
+          <a:p>
+            <a:pPr algn="ctr"/>
+            <a:r>
+              <a:rPr lang="en-US" dirty="0"/>
+              <a:t>In use</a:t>
+            </a:r>
+          </a:p>
+        </p:txBody>
+      </p:sp>
+      <p:sp>
+        <p:nvSpPr>
+          <p:cNvPr id="11" name="TextBox 10">
+            <a:extLst>
+              <a:ext uri="{FF2B5EF4-FFF2-40B4-BE49-F238E27FC236}">
+                <a16:creationId xmlns:a16="http://schemas.microsoft.com/office/drawing/2014/main" id="{FCD03103-8367-B1B5-52B3-15EEEC403B12}"/>
+              </a:ext>
+            </a:extLst>
+          </p:cNvPr>
+          <p:cNvSpPr txBox="1"/>
+          <p:nvPr/>
+        </p:nvSpPr>
+        <p:spPr>
+          <a:xfrm>
+            <a:off x="7248939" y="3361635"/>
+            <a:ext cx="2513496" cy="2031325"/>
+          </a:xfrm>
+          <a:prstGeom prst="rect">
+            <a:avLst/>
+          </a:prstGeom>
+          <a:noFill/>
+        </p:spPr>
+        <p:txBody>
+          <a:bodyPr wrap="square" rtlCol="0">
+            <a:spAutoFit/>
+          </a:bodyPr>
+          <a:lstStyle/>
+          <a:p>
+            <a:r>
+              <a:rPr lang="en-US" dirty="0"/>
+              <a:t>Every object here is in generation 0. There have been no previous GCs on any of the objects</a:t>
+            </a:r>
+          </a:p>
+          <a:p>
+            <a:endParaRPr lang="en-US" dirty="0"/>
+          </a:p>
+          <a:p>
+            <a:r>
+              <a:rPr lang="en-US" dirty="0"/>
+              <a:t>After running a Gen 0 GC, it will look like?</a:t>
+            </a:r>
+          </a:p>
+        </p:txBody>
+      </p:sp>
+    </p:spTree>
+    <p:extLst>
+      <p:ext uri="{BB962C8B-B14F-4D97-AF65-F5344CB8AC3E}">
+        <p14:creationId xmlns:p14="http://schemas.microsoft.com/office/powerpoint/2010/main" val="4153461267"/>
+      </p:ext>
+    </p:extLst>
+  </p:cSld>
+  <p:clrMapOvr>
+    <a:masterClrMapping/>
+  </p:clrMapOvr>
+</p:sld>
+</file>
+
+<file path=ppt/slides/slide23.xml><?xml version="1.0" encoding="utf-8"?>
+<p:sld xmlns:a="http://schemas.openxmlformats.org/drawingml/2006/main" xmlns:r="http://schemas.openxmlformats.org/officeDocument/2006/relationships" xmlns:p="http://schemas.openxmlformats.org/presentationml/2006/main">
+  <p:cSld>
+    <p:spTree>
+      <p:nvGrpSpPr>
+        <p:cNvPr id="1" name=""/>
+        <p:cNvGrpSpPr/>
+        <p:nvPr/>
+      </p:nvGrpSpPr>
+      <p:grpSpPr>
+        <a:xfrm>
+          <a:off x="0" y="0"/>
+          <a:ext cx="0" cy="0"/>
+          <a:chOff x="0" y="0"/>
+          <a:chExt cx="0" cy="0"/>
+        </a:xfrm>
+      </p:grpSpPr>
+      <p:sp>
+        <p:nvSpPr>
+          <p:cNvPr id="2" name="Title 1">
+            <a:extLst>
+              <a:ext uri="{FF2B5EF4-FFF2-40B4-BE49-F238E27FC236}">
+                <a16:creationId xmlns:a16="http://schemas.microsoft.com/office/drawing/2014/main" id="{DD77E620-ED17-29F0-49C1-BA44F26A2145}"/>
+              </a:ext>
+            </a:extLst>
+          </p:cNvPr>
+          <p:cNvSpPr>
+            <a:spLocks noGrp="1"/>
+          </p:cNvSpPr>
+          <p:nvPr>
+            <p:ph type="title"/>
+          </p:nvPr>
+        </p:nvSpPr>
+        <p:spPr/>
+        <p:txBody>
+          <a:bodyPr/>
+          <a:lstStyle/>
+          <a:p>
+            <a:r>
+              <a:rPr lang="en-US" dirty="0"/>
+              <a:t>Example</a:t>
+            </a:r>
+          </a:p>
+        </p:txBody>
+      </p:sp>
+      <p:sp>
+        <p:nvSpPr>
+          <p:cNvPr id="4" name="Rectangle 3">
+            <a:extLst>
+              <a:ext uri="{FF2B5EF4-FFF2-40B4-BE49-F238E27FC236}">
+                <a16:creationId xmlns:a16="http://schemas.microsoft.com/office/drawing/2014/main" id="{978107BF-32B4-2151-18EC-3F842645CCDE}"/>
+              </a:ext>
+            </a:extLst>
+          </p:cNvPr>
+          <p:cNvSpPr/>
+          <p:nvPr/>
+        </p:nvSpPr>
+        <p:spPr>
+          <a:xfrm>
+            <a:off x="679174" y="1901213"/>
+            <a:ext cx="757260" cy="544060"/>
+          </a:xfrm>
+          <a:prstGeom prst="rect">
+            <a:avLst/>
+          </a:prstGeom>
+        </p:spPr>
+        <p:style>
+          <a:lnRef idx="2">
+            <a:schemeClr val="accent2">
+              <a:shade val="50000"/>
+            </a:schemeClr>
+          </a:lnRef>
+          <a:fillRef idx="1">
+            <a:schemeClr val="accent2"/>
+          </a:fillRef>
+          <a:effectRef idx="0">
+            <a:schemeClr val="accent2"/>
+          </a:effectRef>
+          <a:fontRef idx="minor">
+            <a:schemeClr val="lt1"/>
+          </a:fontRef>
+        </p:style>
+        <p:txBody>
+          <a:bodyPr rtlCol="0" anchor="ctr"/>
+          <a:lstStyle/>
+          <a:p>
+            <a:pPr algn="ctr"/>
+            <a:r>
+              <a:rPr lang="en-US" dirty="0"/>
+              <a:t>A</a:t>
+            </a:r>
+          </a:p>
+        </p:txBody>
+      </p:sp>
+      <p:sp>
+        <p:nvSpPr>
+          <p:cNvPr id="5" name="Rectangle 4">
+            <a:extLst>
+              <a:ext uri="{FF2B5EF4-FFF2-40B4-BE49-F238E27FC236}">
+                <a16:creationId xmlns:a16="http://schemas.microsoft.com/office/drawing/2014/main" id="{624B90BA-275C-5BE0-958A-C4C98F06DBF1}"/>
+              </a:ext>
+            </a:extLst>
+          </p:cNvPr>
+          <p:cNvSpPr/>
+          <p:nvPr/>
+        </p:nvSpPr>
+        <p:spPr>
+          <a:xfrm>
+            <a:off x="1436434" y="1901213"/>
+            <a:ext cx="757260" cy="544060"/>
+          </a:xfrm>
+          <a:prstGeom prst="rect">
+            <a:avLst/>
+          </a:prstGeom>
+        </p:spPr>
+        <p:style>
+          <a:lnRef idx="2">
+            <a:schemeClr val="accent2">
+              <a:shade val="50000"/>
+            </a:schemeClr>
+          </a:lnRef>
+          <a:fillRef idx="1">
+            <a:schemeClr val="accent2"/>
+          </a:fillRef>
+          <a:effectRef idx="0">
+            <a:schemeClr val="accent2"/>
+          </a:effectRef>
+          <a:fontRef idx="minor">
+            <a:schemeClr val="lt1"/>
+          </a:fontRef>
+        </p:style>
+        <p:txBody>
+          <a:bodyPr rtlCol="0" anchor="ctr"/>
+          <a:lstStyle/>
+          <a:p>
+            <a:pPr algn="ctr"/>
+            <a:r>
+              <a:rPr lang="en-US" dirty="0"/>
+              <a:t>B</a:t>
+            </a:r>
+          </a:p>
+        </p:txBody>
+      </p:sp>
+      <p:sp>
+        <p:nvSpPr>
+          <p:cNvPr id="7" name="Rectangle 6">
+            <a:extLst>
+              <a:ext uri="{FF2B5EF4-FFF2-40B4-BE49-F238E27FC236}">
+                <a16:creationId xmlns:a16="http://schemas.microsoft.com/office/drawing/2014/main" id="{57E69964-16F2-E3A5-8FC0-F9CB54CB78B5}"/>
+              </a:ext>
+            </a:extLst>
+          </p:cNvPr>
+          <p:cNvSpPr/>
+          <p:nvPr/>
+        </p:nvSpPr>
+        <p:spPr>
+          <a:xfrm>
+            <a:off x="2193694" y="1901213"/>
+            <a:ext cx="757260" cy="544060"/>
+          </a:xfrm>
+          <a:prstGeom prst="rect">
+            <a:avLst/>
+          </a:prstGeom>
+        </p:spPr>
+        <p:style>
+          <a:lnRef idx="2">
+            <a:schemeClr val="accent2">
+              <a:shade val="50000"/>
+            </a:schemeClr>
+          </a:lnRef>
+          <a:fillRef idx="1">
+            <a:schemeClr val="accent2"/>
+          </a:fillRef>
+          <a:effectRef idx="0">
+            <a:schemeClr val="accent2"/>
+          </a:effectRef>
+          <a:fontRef idx="minor">
+            <a:schemeClr val="lt1"/>
+          </a:fontRef>
+        </p:style>
+        <p:txBody>
+          <a:bodyPr rtlCol="0" anchor="ctr"/>
+          <a:lstStyle/>
+          <a:p>
+            <a:pPr algn="ctr"/>
+            <a:r>
+              <a:rPr lang="en-US" dirty="0"/>
+              <a:t>D</a:t>
+            </a:r>
+          </a:p>
+        </p:txBody>
+      </p:sp>
+      <p:sp>
+        <p:nvSpPr>
+          <p:cNvPr id="9" name="Rectangle 8">
+            <a:extLst>
+              <a:ext uri="{FF2B5EF4-FFF2-40B4-BE49-F238E27FC236}">
+                <a16:creationId xmlns:a16="http://schemas.microsoft.com/office/drawing/2014/main" id="{03E14132-893A-9588-E1F1-B5F06AF3AA4D}"/>
+              </a:ext>
+            </a:extLst>
+          </p:cNvPr>
+          <p:cNvSpPr/>
+          <p:nvPr/>
+        </p:nvSpPr>
+        <p:spPr>
+          <a:xfrm>
+            <a:off x="9508812" y="845608"/>
+            <a:ext cx="1533837" cy="544060"/>
+          </a:xfrm>
+          <a:prstGeom prst="rect">
+            <a:avLst/>
+          </a:prstGeom>
+        </p:spPr>
+        <p:style>
+          <a:lnRef idx="2">
+            <a:schemeClr val="accent1">
+              <a:shade val="50000"/>
+            </a:schemeClr>
+          </a:lnRef>
+          <a:fillRef idx="1">
+            <a:schemeClr val="accent1"/>
+          </a:fillRef>
+          <a:effectRef idx="0">
+            <a:schemeClr val="accent1"/>
+          </a:effectRef>
+          <a:fontRef idx="minor">
+            <a:schemeClr val="lt1"/>
+          </a:fontRef>
+        </p:style>
+        <p:txBody>
+          <a:bodyPr rtlCol="0" anchor="ctr"/>
+          <a:lstStyle/>
+          <a:p>
+            <a:pPr algn="ctr"/>
+            <a:r>
+              <a:rPr lang="en-US" dirty="0"/>
+              <a:t>Discard</a:t>
+            </a:r>
+          </a:p>
+        </p:txBody>
+      </p:sp>
+      <p:sp>
+        <p:nvSpPr>
+          <p:cNvPr id="10" name="Rectangle 9">
+            <a:extLst>
+              <a:ext uri="{FF2B5EF4-FFF2-40B4-BE49-F238E27FC236}">
+                <a16:creationId xmlns:a16="http://schemas.microsoft.com/office/drawing/2014/main" id="{46F7797C-3CE4-2292-0AE9-5EB9A712E28E}"/>
+              </a:ext>
+            </a:extLst>
+          </p:cNvPr>
+          <p:cNvSpPr/>
+          <p:nvPr/>
+        </p:nvSpPr>
+        <p:spPr>
+          <a:xfrm>
+            <a:off x="9518469" y="1690688"/>
+            <a:ext cx="1533837" cy="544060"/>
+          </a:xfrm>
+          <a:prstGeom prst="rect">
+            <a:avLst/>
+          </a:prstGeom>
+        </p:spPr>
+        <p:style>
+          <a:lnRef idx="2">
+            <a:schemeClr val="accent2">
+              <a:shade val="50000"/>
+            </a:schemeClr>
+          </a:lnRef>
+          <a:fillRef idx="1">
+            <a:schemeClr val="accent2"/>
+          </a:fillRef>
+          <a:effectRef idx="0">
+            <a:schemeClr val="accent2"/>
+          </a:effectRef>
+          <a:fontRef idx="minor">
+            <a:schemeClr val="lt1"/>
+          </a:fontRef>
+        </p:style>
+        <p:txBody>
+          <a:bodyPr rtlCol="0" anchor="ctr"/>
+          <a:lstStyle/>
+          <a:p>
+            <a:pPr algn="ctr"/>
+            <a:r>
+              <a:rPr lang="en-US" dirty="0"/>
+              <a:t>In use</a:t>
+            </a:r>
+          </a:p>
+        </p:txBody>
+      </p:sp>
+      <p:sp>
+        <p:nvSpPr>
+          <p:cNvPr id="3" name="Arrow: Left-Right 2">
+            <a:extLst>
+              <a:ext uri="{FF2B5EF4-FFF2-40B4-BE49-F238E27FC236}">
+                <a16:creationId xmlns:a16="http://schemas.microsoft.com/office/drawing/2014/main" id="{9C13756E-DCA9-4A2E-FA81-8C2426E7F6DD}"/>
+              </a:ext>
+            </a:extLst>
+          </p:cNvPr>
+          <p:cNvSpPr/>
+          <p:nvPr/>
+        </p:nvSpPr>
+        <p:spPr>
+          <a:xfrm>
+            <a:off x="2950954" y="2760868"/>
+            <a:ext cx="2177774" cy="353391"/>
+          </a:xfrm>
+          <a:prstGeom prst="leftRightArrow">
+            <a:avLst/>
+          </a:prstGeom>
+        </p:spPr>
+        <p:style>
+          <a:lnRef idx="2">
+            <a:schemeClr val="accent1">
+              <a:shade val="50000"/>
+            </a:schemeClr>
+          </a:lnRef>
+          <a:fillRef idx="1">
+            <a:schemeClr val="accent1"/>
+          </a:fillRef>
+          <a:effectRef idx="0">
+            <a:schemeClr val="accent1"/>
+          </a:effectRef>
+          <a:fontRef idx="minor">
+            <a:schemeClr val="lt1"/>
+          </a:fontRef>
+        </p:style>
+        <p:txBody>
+          <a:bodyPr rtlCol="0" anchor="ctr"/>
+          <a:lstStyle/>
+          <a:p>
+            <a:pPr algn="ctr"/>
+            <a:r>
+              <a:rPr lang="en-US" dirty="0"/>
+              <a:t>Gen 0</a:t>
+            </a:r>
+          </a:p>
+        </p:txBody>
+      </p:sp>
+      <p:sp>
+        <p:nvSpPr>
+          <p:cNvPr id="12" name="Arrow: Left-Right 11">
+            <a:extLst>
+              <a:ext uri="{FF2B5EF4-FFF2-40B4-BE49-F238E27FC236}">
+                <a16:creationId xmlns:a16="http://schemas.microsoft.com/office/drawing/2014/main" id="{21AB9730-0473-D58F-1BDD-D678E559DC88}"/>
+              </a:ext>
+            </a:extLst>
+          </p:cNvPr>
+          <p:cNvSpPr/>
+          <p:nvPr/>
+        </p:nvSpPr>
+        <p:spPr>
+          <a:xfrm>
+            <a:off x="679174" y="2760868"/>
+            <a:ext cx="2177774" cy="353391"/>
+          </a:xfrm>
+          <a:prstGeom prst="leftRightArrow">
+            <a:avLst/>
+          </a:prstGeom>
+        </p:spPr>
+        <p:style>
+          <a:lnRef idx="2">
+            <a:schemeClr val="accent1">
+              <a:shade val="50000"/>
+            </a:schemeClr>
+          </a:lnRef>
+          <a:fillRef idx="1">
+            <a:schemeClr val="accent1"/>
+          </a:fillRef>
+          <a:effectRef idx="0">
+            <a:schemeClr val="accent1"/>
+          </a:effectRef>
+          <a:fontRef idx="minor">
+            <a:schemeClr val="lt1"/>
+          </a:fontRef>
+        </p:style>
+        <p:txBody>
+          <a:bodyPr rtlCol="0" anchor="ctr"/>
+          <a:lstStyle/>
+          <a:p>
+            <a:pPr algn="ctr"/>
+            <a:r>
+              <a:rPr lang="en-US" dirty="0"/>
+              <a:t>Gen 1</a:t>
+            </a:r>
+          </a:p>
+        </p:txBody>
+      </p:sp>
+      <p:sp>
+        <p:nvSpPr>
+          <p:cNvPr id="13" name="TextBox 12">
+            <a:extLst>
+              <a:ext uri="{FF2B5EF4-FFF2-40B4-BE49-F238E27FC236}">
+                <a16:creationId xmlns:a16="http://schemas.microsoft.com/office/drawing/2014/main" id="{BAC449E8-3E29-3436-9075-CA27E615761B}"/>
+              </a:ext>
+            </a:extLst>
+          </p:cNvPr>
+          <p:cNvSpPr txBox="1"/>
+          <p:nvPr/>
+        </p:nvSpPr>
+        <p:spPr>
+          <a:xfrm>
+            <a:off x="7248939" y="3361635"/>
+            <a:ext cx="2513496" cy="2031325"/>
+          </a:xfrm>
+          <a:prstGeom prst="rect">
+            <a:avLst/>
+          </a:prstGeom>
+          <a:noFill/>
+        </p:spPr>
+        <p:txBody>
+          <a:bodyPr wrap="square" rtlCol="0">
+            <a:spAutoFit/>
+          </a:bodyPr>
+          <a:lstStyle/>
+          <a:p>
+            <a:r>
+              <a:rPr lang="en-US" dirty="0"/>
+              <a:t>Every object here is in generation 0. There have been no previous GCs on any of the objects</a:t>
+            </a:r>
+          </a:p>
+          <a:p>
+            <a:endParaRPr lang="en-US" dirty="0"/>
+          </a:p>
+          <a:p>
+            <a:r>
+              <a:rPr lang="en-US" dirty="0"/>
+              <a:t>After running a Gen 0 GC, it will look like?</a:t>
+            </a:r>
+          </a:p>
+        </p:txBody>
+      </p:sp>
+    </p:spTree>
+    <p:extLst>
+      <p:ext uri="{BB962C8B-B14F-4D97-AF65-F5344CB8AC3E}">
+        <p14:creationId xmlns:p14="http://schemas.microsoft.com/office/powerpoint/2010/main" val="3329846049"/>
+      </p:ext>
+    </p:extLst>
+  </p:cSld>
+  <p:clrMapOvr>
+    <a:masterClrMapping/>
+  </p:clrMapOvr>
+</p:sld>
+</file>
+
+<file path=ppt/slides/slide24.xml><?xml version="1.0" encoding="utf-8"?>
+<p:sld xmlns:a="http://schemas.openxmlformats.org/drawingml/2006/main" xmlns:r="http://schemas.openxmlformats.org/officeDocument/2006/relationships" xmlns:p="http://schemas.openxmlformats.org/presentationml/2006/main">
+  <p:cSld>
+    <p:spTree>
+      <p:nvGrpSpPr>
+        <p:cNvPr id="1" name=""/>
+        <p:cNvGrpSpPr/>
+        <p:nvPr/>
+      </p:nvGrpSpPr>
+      <p:grpSpPr>
+        <a:xfrm>
+          <a:off x="0" y="0"/>
+          <a:ext cx="0" cy="0"/>
+          <a:chOff x="0" y="0"/>
+          <a:chExt cx="0" cy="0"/>
+        </a:xfrm>
+      </p:grpSpPr>
+      <p:sp>
+        <p:nvSpPr>
+          <p:cNvPr id="2" name="Title 1">
+            <a:extLst>
+              <a:ext uri="{FF2B5EF4-FFF2-40B4-BE49-F238E27FC236}">
+                <a16:creationId xmlns:a16="http://schemas.microsoft.com/office/drawing/2014/main" id="{DD77E620-ED17-29F0-49C1-BA44F26A2145}"/>
+              </a:ext>
+            </a:extLst>
+          </p:cNvPr>
+          <p:cNvSpPr>
+            <a:spLocks noGrp="1"/>
+          </p:cNvSpPr>
+          <p:nvPr>
+            <p:ph type="title"/>
+          </p:nvPr>
+        </p:nvSpPr>
+        <p:spPr/>
+        <p:txBody>
+          <a:bodyPr/>
+          <a:lstStyle/>
+          <a:p>
+            <a:r>
+              <a:rPr lang="en-US" dirty="0"/>
+              <a:t>Example</a:t>
+            </a:r>
+          </a:p>
+        </p:txBody>
+      </p:sp>
+      <p:sp>
+        <p:nvSpPr>
+          <p:cNvPr id="4" name="Rectangle 3">
+            <a:extLst>
+              <a:ext uri="{FF2B5EF4-FFF2-40B4-BE49-F238E27FC236}">
+                <a16:creationId xmlns:a16="http://schemas.microsoft.com/office/drawing/2014/main" id="{978107BF-32B4-2151-18EC-3F842645CCDE}"/>
+              </a:ext>
+            </a:extLst>
+          </p:cNvPr>
+          <p:cNvSpPr/>
+          <p:nvPr/>
+        </p:nvSpPr>
+        <p:spPr>
+          <a:xfrm>
+            <a:off x="679174" y="1901213"/>
+            <a:ext cx="757260" cy="544060"/>
+          </a:xfrm>
+          <a:prstGeom prst="rect">
+            <a:avLst/>
+          </a:prstGeom>
+        </p:spPr>
+        <p:style>
+          <a:lnRef idx="2">
+            <a:schemeClr val="accent2">
+              <a:shade val="50000"/>
+            </a:schemeClr>
+          </a:lnRef>
+          <a:fillRef idx="1">
+            <a:schemeClr val="accent2"/>
+          </a:fillRef>
+          <a:effectRef idx="0">
+            <a:schemeClr val="accent2"/>
+          </a:effectRef>
+          <a:fontRef idx="minor">
+            <a:schemeClr val="lt1"/>
+          </a:fontRef>
+        </p:style>
+        <p:txBody>
+          <a:bodyPr rtlCol="0" anchor="ctr"/>
+          <a:lstStyle/>
+          <a:p>
+            <a:pPr algn="ctr"/>
+            <a:r>
+              <a:rPr lang="en-US" dirty="0"/>
+              <a:t>A</a:t>
+            </a:r>
+          </a:p>
+        </p:txBody>
+      </p:sp>
+      <p:sp>
+        <p:nvSpPr>
+          <p:cNvPr id="5" name="Rectangle 4">
+            <a:extLst>
+              <a:ext uri="{FF2B5EF4-FFF2-40B4-BE49-F238E27FC236}">
+                <a16:creationId xmlns:a16="http://schemas.microsoft.com/office/drawing/2014/main" id="{624B90BA-275C-5BE0-958A-C4C98F06DBF1}"/>
+              </a:ext>
+            </a:extLst>
+          </p:cNvPr>
+          <p:cNvSpPr/>
+          <p:nvPr/>
+        </p:nvSpPr>
+        <p:spPr>
+          <a:xfrm>
+            <a:off x="1436434" y="1900761"/>
+            <a:ext cx="757260" cy="544060"/>
+          </a:xfrm>
+          <a:prstGeom prst="rect">
+            <a:avLst/>
+          </a:prstGeom>
+        </p:spPr>
+        <p:style>
+          <a:lnRef idx="2">
+            <a:schemeClr val="accent1">
+              <a:shade val="50000"/>
+            </a:schemeClr>
+          </a:lnRef>
+          <a:fillRef idx="1">
+            <a:schemeClr val="accent1"/>
+          </a:fillRef>
+          <a:effectRef idx="0">
+            <a:schemeClr val="accent1"/>
+          </a:effectRef>
+          <a:fontRef idx="minor">
+            <a:schemeClr val="lt1"/>
+          </a:fontRef>
+        </p:style>
+        <p:txBody>
+          <a:bodyPr rtlCol="0" anchor="ctr"/>
+          <a:lstStyle/>
+          <a:p>
+            <a:pPr algn="ctr"/>
+            <a:r>
+              <a:rPr lang="en-US" dirty="0"/>
+              <a:t>B</a:t>
+            </a:r>
+          </a:p>
+        </p:txBody>
+      </p:sp>
+      <p:sp>
+        <p:nvSpPr>
+          <p:cNvPr id="7" name="Rectangle 6">
+            <a:extLst>
+              <a:ext uri="{FF2B5EF4-FFF2-40B4-BE49-F238E27FC236}">
+                <a16:creationId xmlns:a16="http://schemas.microsoft.com/office/drawing/2014/main" id="{57E69964-16F2-E3A5-8FC0-F9CB54CB78B5}"/>
+              </a:ext>
+            </a:extLst>
+          </p:cNvPr>
+          <p:cNvSpPr/>
+          <p:nvPr/>
+        </p:nvSpPr>
+        <p:spPr>
+          <a:xfrm>
+            <a:off x="2193694" y="1901213"/>
+            <a:ext cx="757260" cy="544060"/>
+          </a:xfrm>
+          <a:prstGeom prst="rect">
+            <a:avLst/>
+          </a:prstGeom>
+        </p:spPr>
+        <p:style>
+          <a:lnRef idx="2">
+            <a:schemeClr val="accent2">
+              <a:shade val="50000"/>
+            </a:schemeClr>
+          </a:lnRef>
+          <a:fillRef idx="1">
+            <a:schemeClr val="accent2"/>
+          </a:fillRef>
+          <a:effectRef idx="0">
+            <a:schemeClr val="accent2"/>
+          </a:effectRef>
+          <a:fontRef idx="minor">
+            <a:schemeClr val="lt1"/>
+          </a:fontRef>
+        </p:style>
+        <p:txBody>
+          <a:bodyPr rtlCol="0" anchor="ctr"/>
+          <a:lstStyle/>
+          <a:p>
+            <a:pPr algn="ctr"/>
+            <a:r>
+              <a:rPr lang="en-US" dirty="0"/>
+              <a:t>D</a:t>
+            </a:r>
+          </a:p>
+        </p:txBody>
+      </p:sp>
+      <p:sp>
+        <p:nvSpPr>
+          <p:cNvPr id="9" name="Rectangle 8">
+            <a:extLst>
+              <a:ext uri="{FF2B5EF4-FFF2-40B4-BE49-F238E27FC236}">
+                <a16:creationId xmlns:a16="http://schemas.microsoft.com/office/drawing/2014/main" id="{03E14132-893A-9588-E1F1-B5F06AF3AA4D}"/>
+              </a:ext>
+            </a:extLst>
+          </p:cNvPr>
+          <p:cNvSpPr/>
+          <p:nvPr/>
+        </p:nvSpPr>
+        <p:spPr>
+          <a:xfrm>
+            <a:off x="9508812" y="845608"/>
+            <a:ext cx="1533837" cy="544060"/>
+          </a:xfrm>
+          <a:prstGeom prst="rect">
+            <a:avLst/>
+          </a:prstGeom>
+        </p:spPr>
+        <p:style>
+          <a:lnRef idx="2">
+            <a:schemeClr val="accent1">
+              <a:shade val="50000"/>
+            </a:schemeClr>
+          </a:lnRef>
+          <a:fillRef idx="1">
+            <a:schemeClr val="accent1"/>
+          </a:fillRef>
+          <a:effectRef idx="0">
+            <a:schemeClr val="accent1"/>
+          </a:effectRef>
+          <a:fontRef idx="minor">
+            <a:schemeClr val="lt1"/>
+          </a:fontRef>
+        </p:style>
+        <p:txBody>
+          <a:bodyPr rtlCol="0" anchor="ctr"/>
+          <a:lstStyle/>
+          <a:p>
+            <a:pPr algn="ctr"/>
+            <a:r>
+              <a:rPr lang="en-US" dirty="0"/>
+              <a:t>Discard</a:t>
+            </a:r>
+          </a:p>
+        </p:txBody>
+      </p:sp>
+      <p:sp>
+        <p:nvSpPr>
+          <p:cNvPr id="10" name="Rectangle 9">
+            <a:extLst>
+              <a:ext uri="{FF2B5EF4-FFF2-40B4-BE49-F238E27FC236}">
+                <a16:creationId xmlns:a16="http://schemas.microsoft.com/office/drawing/2014/main" id="{46F7797C-3CE4-2292-0AE9-5EB9A712E28E}"/>
+              </a:ext>
+            </a:extLst>
+          </p:cNvPr>
+          <p:cNvSpPr/>
+          <p:nvPr/>
+        </p:nvSpPr>
+        <p:spPr>
+          <a:xfrm>
+            <a:off x="9518469" y="1690688"/>
+            <a:ext cx="1533837" cy="544060"/>
+          </a:xfrm>
+          <a:prstGeom prst="rect">
+            <a:avLst/>
+          </a:prstGeom>
+        </p:spPr>
+        <p:style>
+          <a:lnRef idx="2">
+            <a:schemeClr val="accent2">
+              <a:shade val="50000"/>
+            </a:schemeClr>
+          </a:lnRef>
+          <a:fillRef idx="1">
+            <a:schemeClr val="accent2"/>
+          </a:fillRef>
+          <a:effectRef idx="0">
+            <a:schemeClr val="accent2"/>
+          </a:effectRef>
+          <a:fontRef idx="minor">
+            <a:schemeClr val="lt1"/>
+          </a:fontRef>
+        </p:style>
+        <p:txBody>
+          <a:bodyPr rtlCol="0" anchor="ctr"/>
+          <a:lstStyle/>
+          <a:p>
+            <a:pPr algn="ctr"/>
+            <a:r>
+              <a:rPr lang="en-US" dirty="0"/>
+              <a:t>In use</a:t>
+            </a:r>
+          </a:p>
+        </p:txBody>
+      </p:sp>
+      <p:sp>
+        <p:nvSpPr>
+          <p:cNvPr id="3" name="Arrow: Left-Right 2">
+            <a:extLst>
+              <a:ext uri="{FF2B5EF4-FFF2-40B4-BE49-F238E27FC236}">
+                <a16:creationId xmlns:a16="http://schemas.microsoft.com/office/drawing/2014/main" id="{9C13756E-DCA9-4A2E-FA81-8C2426E7F6DD}"/>
+              </a:ext>
+            </a:extLst>
+          </p:cNvPr>
+          <p:cNvSpPr/>
+          <p:nvPr/>
+        </p:nvSpPr>
+        <p:spPr>
+          <a:xfrm>
+            <a:off x="2950954" y="2760868"/>
+            <a:ext cx="2177774" cy="353391"/>
+          </a:xfrm>
+          <a:prstGeom prst="leftRightArrow">
+            <a:avLst/>
+          </a:prstGeom>
+        </p:spPr>
+        <p:style>
+          <a:lnRef idx="2">
+            <a:schemeClr val="accent1">
+              <a:shade val="50000"/>
+            </a:schemeClr>
+          </a:lnRef>
+          <a:fillRef idx="1">
+            <a:schemeClr val="accent1"/>
+          </a:fillRef>
+          <a:effectRef idx="0">
+            <a:schemeClr val="accent1"/>
+          </a:effectRef>
+          <a:fontRef idx="minor">
+            <a:schemeClr val="lt1"/>
+          </a:fontRef>
+        </p:style>
+        <p:txBody>
+          <a:bodyPr rtlCol="0" anchor="ctr"/>
+          <a:lstStyle/>
+          <a:p>
+            <a:pPr algn="ctr"/>
+            <a:r>
+              <a:rPr lang="en-US" dirty="0"/>
+              <a:t>Gen 0</a:t>
+            </a:r>
+          </a:p>
+        </p:txBody>
+      </p:sp>
+      <p:sp>
+        <p:nvSpPr>
+          <p:cNvPr id="12" name="Arrow: Left-Right 11">
+            <a:extLst>
+              <a:ext uri="{FF2B5EF4-FFF2-40B4-BE49-F238E27FC236}">
+                <a16:creationId xmlns:a16="http://schemas.microsoft.com/office/drawing/2014/main" id="{21AB9730-0473-D58F-1BDD-D678E559DC88}"/>
+              </a:ext>
+            </a:extLst>
+          </p:cNvPr>
+          <p:cNvSpPr/>
+          <p:nvPr/>
+        </p:nvSpPr>
+        <p:spPr>
+          <a:xfrm>
+            <a:off x="679174" y="2760868"/>
+            <a:ext cx="2177774" cy="353391"/>
+          </a:xfrm>
+          <a:prstGeom prst="leftRightArrow">
+            <a:avLst/>
+          </a:prstGeom>
+        </p:spPr>
+        <p:style>
+          <a:lnRef idx="2">
+            <a:schemeClr val="accent1">
+              <a:shade val="50000"/>
+            </a:schemeClr>
+          </a:lnRef>
+          <a:fillRef idx="1">
+            <a:schemeClr val="accent1"/>
+          </a:fillRef>
+          <a:effectRef idx="0">
+            <a:schemeClr val="accent1"/>
+          </a:effectRef>
+          <a:fontRef idx="minor">
+            <a:schemeClr val="lt1"/>
+          </a:fontRef>
+        </p:style>
+        <p:txBody>
+          <a:bodyPr rtlCol="0" anchor="ctr"/>
+          <a:lstStyle/>
+          <a:p>
+            <a:pPr algn="ctr"/>
+            <a:r>
+              <a:rPr lang="en-US" dirty="0"/>
+              <a:t>Gen 1</a:t>
+            </a:r>
+          </a:p>
+        </p:txBody>
+      </p:sp>
+      <p:sp>
+        <p:nvSpPr>
+          <p:cNvPr id="6" name="Rectangle 5">
+            <a:extLst>
+              <a:ext uri="{FF2B5EF4-FFF2-40B4-BE49-F238E27FC236}">
+                <a16:creationId xmlns:a16="http://schemas.microsoft.com/office/drawing/2014/main" id="{F6140229-270A-D040-C250-B0BB9F513581}"/>
+              </a:ext>
+            </a:extLst>
+          </p:cNvPr>
+          <p:cNvSpPr/>
+          <p:nvPr/>
+        </p:nvSpPr>
+        <p:spPr>
+          <a:xfrm>
+            <a:off x="2934252" y="1901213"/>
+            <a:ext cx="757260" cy="544060"/>
+          </a:xfrm>
+          <a:prstGeom prst="rect">
+            <a:avLst/>
+          </a:prstGeom>
+        </p:spPr>
+        <p:style>
+          <a:lnRef idx="2">
+            <a:schemeClr val="accent1">
+              <a:shade val="50000"/>
+            </a:schemeClr>
+          </a:lnRef>
+          <a:fillRef idx="1">
+            <a:schemeClr val="accent1"/>
+          </a:fillRef>
+          <a:effectRef idx="0">
+            <a:schemeClr val="accent1"/>
+          </a:effectRef>
+          <a:fontRef idx="minor">
+            <a:schemeClr val="lt1"/>
+          </a:fontRef>
+        </p:style>
+        <p:txBody>
+          <a:bodyPr rtlCol="0" anchor="ctr"/>
+          <a:lstStyle/>
+          <a:p>
+            <a:pPr algn="ctr"/>
+            <a:r>
+              <a:rPr lang="en-US" dirty="0"/>
+              <a:t>E</a:t>
+            </a:r>
+          </a:p>
+        </p:txBody>
+      </p:sp>
+      <p:sp>
+        <p:nvSpPr>
+          <p:cNvPr id="8" name="Rectangle 7">
+            <a:extLst>
+              <a:ext uri="{FF2B5EF4-FFF2-40B4-BE49-F238E27FC236}">
+                <a16:creationId xmlns:a16="http://schemas.microsoft.com/office/drawing/2014/main" id="{29125724-18BA-0799-7C49-90FD6843A76A}"/>
+              </a:ext>
+            </a:extLst>
+          </p:cNvPr>
+          <p:cNvSpPr/>
+          <p:nvPr/>
+        </p:nvSpPr>
+        <p:spPr>
+          <a:xfrm>
+            <a:off x="3691512" y="1901213"/>
+            <a:ext cx="757260" cy="544060"/>
+          </a:xfrm>
+          <a:prstGeom prst="rect">
+            <a:avLst/>
+          </a:prstGeom>
+        </p:spPr>
+        <p:style>
+          <a:lnRef idx="2">
+            <a:schemeClr val="accent1">
+              <a:shade val="50000"/>
+            </a:schemeClr>
+          </a:lnRef>
+          <a:fillRef idx="1">
+            <a:schemeClr val="accent1"/>
+          </a:fillRef>
+          <a:effectRef idx="0">
+            <a:schemeClr val="accent1"/>
+          </a:effectRef>
+          <a:fontRef idx="minor">
+            <a:schemeClr val="lt1"/>
+          </a:fontRef>
+        </p:style>
+        <p:txBody>
+          <a:bodyPr rtlCol="0" anchor="ctr"/>
+          <a:lstStyle/>
+          <a:p>
+            <a:pPr algn="ctr"/>
+            <a:r>
+              <a:rPr lang="en-US" dirty="0"/>
+              <a:t>F</a:t>
+            </a:r>
+          </a:p>
+        </p:txBody>
+      </p:sp>
+      <p:sp>
+        <p:nvSpPr>
+          <p:cNvPr id="11" name="Rectangle 10">
+            <a:extLst>
+              <a:ext uri="{FF2B5EF4-FFF2-40B4-BE49-F238E27FC236}">
+                <a16:creationId xmlns:a16="http://schemas.microsoft.com/office/drawing/2014/main" id="{7AD20623-2D38-165B-31C7-246479F15998}"/>
+              </a:ext>
+            </a:extLst>
+          </p:cNvPr>
+          <p:cNvSpPr/>
+          <p:nvPr/>
+        </p:nvSpPr>
+        <p:spPr>
+          <a:xfrm>
+            <a:off x="4448772" y="1901213"/>
+            <a:ext cx="757260" cy="544060"/>
+          </a:xfrm>
+          <a:prstGeom prst="rect">
+            <a:avLst/>
+          </a:prstGeom>
+        </p:spPr>
+        <p:style>
+          <a:lnRef idx="2">
+            <a:schemeClr val="accent2">
+              <a:shade val="50000"/>
+            </a:schemeClr>
+          </a:lnRef>
+          <a:fillRef idx="1">
+            <a:schemeClr val="accent2"/>
+          </a:fillRef>
+          <a:effectRef idx="0">
+            <a:schemeClr val="accent2"/>
+          </a:effectRef>
+          <a:fontRef idx="minor">
+            <a:schemeClr val="lt1"/>
+          </a:fontRef>
+        </p:style>
+        <p:txBody>
+          <a:bodyPr rtlCol="0" anchor="ctr"/>
+          <a:lstStyle/>
+          <a:p>
+            <a:pPr algn="ctr"/>
+            <a:r>
+              <a:rPr lang="en-US" dirty="0"/>
+              <a:t>G</a:t>
+            </a:r>
+          </a:p>
+        </p:txBody>
+      </p:sp>
+      <p:sp>
+        <p:nvSpPr>
+          <p:cNvPr id="13" name="TextBox 12">
+            <a:extLst>
+              <a:ext uri="{FF2B5EF4-FFF2-40B4-BE49-F238E27FC236}">
+                <a16:creationId xmlns:a16="http://schemas.microsoft.com/office/drawing/2014/main" id="{DD480B25-F9B7-283F-50CE-E36A0C4A9CEA}"/>
+              </a:ext>
+            </a:extLst>
+          </p:cNvPr>
+          <p:cNvSpPr txBox="1"/>
+          <p:nvPr/>
+        </p:nvSpPr>
+        <p:spPr>
+          <a:xfrm>
+            <a:off x="7244521" y="3374887"/>
+            <a:ext cx="2513496" cy="1200329"/>
+          </a:xfrm>
+          <a:prstGeom prst="rect">
+            <a:avLst/>
+          </a:prstGeom>
+          <a:noFill/>
+        </p:spPr>
+        <p:txBody>
+          <a:bodyPr wrap="square" rtlCol="0">
+            <a:spAutoFit/>
+          </a:bodyPr>
+          <a:lstStyle/>
+          <a:p>
+            <a:r>
+              <a:rPr lang="en-US" dirty="0"/>
+              <a:t>We’re going to set arbitrary limits on the size of gen 1 and gen 2 at 4 and 4 respectively.  </a:t>
+            </a:r>
+          </a:p>
+        </p:txBody>
+      </p:sp>
+    </p:spTree>
+    <p:extLst>
+      <p:ext uri="{BB962C8B-B14F-4D97-AF65-F5344CB8AC3E}">
+        <p14:creationId xmlns:p14="http://schemas.microsoft.com/office/powerpoint/2010/main" val="3958046116"/>
+      </p:ext>
+    </p:extLst>
+  </p:cSld>
+  <p:clrMapOvr>
+    <a:masterClrMapping/>
+  </p:clrMapOvr>
+</p:sld>
+</file>
+
 <file path=ppt/slides/slide3.xml><?xml version="1.0" encoding="utf-8"?>
 <p:sld xmlns:a="http://schemas.openxmlformats.org/drawingml/2006/main" xmlns:r="http://schemas.openxmlformats.org/officeDocument/2006/relationships" xmlns:p="http://schemas.openxmlformats.org/presentationml/2006/main">
   <p:cSld>

</xml_diff>